<commit_message>
Test app & graphics
</commit_message>
<xml_diff>
--- a/SirclDocs-Graphical Assets.pptx
+++ b/SirclDocs-Graphical Assets.pptx
@@ -108,6 +108,11 @@
       </a:defRPr>
     </a:lvl9pPr>
   </p:defaultTextStyle>
+  <p:extLst>
+    <p:ext uri="{EFAFB233-063F-42B5-8137-9DF3F51BA10A}">
+      <p15:sldGuideLst xmlns:p15="http://schemas.microsoft.com/office/powerpoint/2012/main"/>
+    </p:ext>
+  </p:extLst>
 </p:presentation>
 </file>
 
@@ -260,7 +265,7 @@
           <a:p>
             <a:fld id="{0B1BF3A2-735E-45AC-B05B-A7BCA271041C}" type="datetimeFigureOut">
               <a:rPr lang="nl-BE" smtClean="0"/>
-              <a:t>2/12/2021</a:t>
+              <a:t>25/09/2024</a:t>
             </a:fld>
             <a:endParaRPr lang="nl-BE"/>
           </a:p>
@@ -460,7 +465,7 @@
           <a:p>
             <a:fld id="{0B1BF3A2-735E-45AC-B05B-A7BCA271041C}" type="datetimeFigureOut">
               <a:rPr lang="nl-BE" smtClean="0"/>
-              <a:t>2/12/2021</a:t>
+              <a:t>25/09/2024</a:t>
             </a:fld>
             <a:endParaRPr lang="nl-BE"/>
           </a:p>
@@ -670,7 +675,7 @@
           <a:p>
             <a:fld id="{0B1BF3A2-735E-45AC-B05B-A7BCA271041C}" type="datetimeFigureOut">
               <a:rPr lang="nl-BE" smtClean="0"/>
-              <a:t>2/12/2021</a:t>
+              <a:t>25/09/2024</a:t>
             </a:fld>
             <a:endParaRPr lang="nl-BE"/>
           </a:p>
@@ -870,7 +875,7 @@
           <a:p>
             <a:fld id="{0B1BF3A2-735E-45AC-B05B-A7BCA271041C}" type="datetimeFigureOut">
               <a:rPr lang="nl-BE" smtClean="0"/>
-              <a:t>2/12/2021</a:t>
+              <a:t>25/09/2024</a:t>
             </a:fld>
             <a:endParaRPr lang="nl-BE"/>
           </a:p>
@@ -1146,7 +1151,7 @@
           <a:p>
             <a:fld id="{0B1BF3A2-735E-45AC-B05B-A7BCA271041C}" type="datetimeFigureOut">
               <a:rPr lang="nl-BE" smtClean="0"/>
-              <a:t>2/12/2021</a:t>
+              <a:t>25/09/2024</a:t>
             </a:fld>
             <a:endParaRPr lang="nl-BE"/>
           </a:p>
@@ -1414,7 +1419,7 @@
           <a:p>
             <a:fld id="{0B1BF3A2-735E-45AC-B05B-A7BCA271041C}" type="datetimeFigureOut">
               <a:rPr lang="nl-BE" smtClean="0"/>
-              <a:t>2/12/2021</a:t>
+              <a:t>25/09/2024</a:t>
             </a:fld>
             <a:endParaRPr lang="nl-BE"/>
           </a:p>
@@ -1829,7 +1834,7 @@
           <a:p>
             <a:fld id="{0B1BF3A2-735E-45AC-B05B-A7BCA271041C}" type="datetimeFigureOut">
               <a:rPr lang="nl-BE" smtClean="0"/>
-              <a:t>2/12/2021</a:t>
+              <a:t>25/09/2024</a:t>
             </a:fld>
             <a:endParaRPr lang="nl-BE"/>
           </a:p>
@@ -1971,7 +1976,7 @@
           <a:p>
             <a:fld id="{0B1BF3A2-735E-45AC-B05B-A7BCA271041C}" type="datetimeFigureOut">
               <a:rPr lang="nl-BE" smtClean="0"/>
-              <a:t>2/12/2021</a:t>
+              <a:t>25/09/2024</a:t>
             </a:fld>
             <a:endParaRPr lang="nl-BE"/>
           </a:p>
@@ -2084,7 +2089,7 @@
           <a:p>
             <a:fld id="{0B1BF3A2-735E-45AC-B05B-A7BCA271041C}" type="datetimeFigureOut">
               <a:rPr lang="nl-BE" smtClean="0"/>
-              <a:t>2/12/2021</a:t>
+              <a:t>25/09/2024</a:t>
             </a:fld>
             <a:endParaRPr lang="nl-BE"/>
           </a:p>
@@ -2397,7 +2402,7 @@
           <a:p>
             <a:fld id="{0B1BF3A2-735E-45AC-B05B-A7BCA271041C}" type="datetimeFigureOut">
               <a:rPr lang="nl-BE" smtClean="0"/>
-              <a:t>2/12/2021</a:t>
+              <a:t>25/09/2024</a:t>
             </a:fld>
             <a:endParaRPr lang="nl-BE"/>
           </a:p>
@@ -2686,7 +2691,7 @@
           <a:p>
             <a:fld id="{0B1BF3A2-735E-45AC-B05B-A7BCA271041C}" type="datetimeFigureOut">
               <a:rPr lang="nl-BE" smtClean="0"/>
-              <a:t>2/12/2021</a:t>
+              <a:t>25/09/2024</a:t>
             </a:fld>
             <a:endParaRPr lang="nl-BE"/>
           </a:p>
@@ -2929,7 +2934,7 @@
           <a:p>
             <a:fld id="{0B1BF3A2-735E-45AC-B05B-A7BCA271041C}" type="datetimeFigureOut">
               <a:rPr lang="nl-BE" smtClean="0"/>
-              <a:t>2/12/2021</a:t>
+              <a:t>25/09/2024</a:t>
             </a:fld>
             <a:endParaRPr lang="nl-BE"/>
           </a:p>
@@ -3393,7 +3398,7 @@
         </p:nvSpPr>
         <p:spPr>
           <a:xfrm>
-            <a:off x="935659" y="2081755"/>
+            <a:off x="1519896" y="2088105"/>
             <a:ext cx="535780" cy="339978"/>
           </a:xfrm>
           <a:prstGeom prst="rect">
@@ -3443,7 +3448,7 @@
         </p:nvSpPr>
         <p:spPr>
           <a:xfrm rot="5400000">
-            <a:off x="2162961" y="2201991"/>
+            <a:off x="2747198" y="2208341"/>
             <a:ext cx="159544" cy="61912"/>
           </a:xfrm>
           <a:prstGeom prst="triangle">
@@ -3497,7 +3502,7 @@
         </p:nvSpPr>
         <p:spPr>
           <a:xfrm rot="5400000">
-            <a:off x="1441636" y="2201991"/>
+            <a:off x="2025873" y="2208341"/>
             <a:ext cx="159544" cy="61912"/>
           </a:xfrm>
           <a:prstGeom prst="triangle">
@@ -3551,7 +3556,7 @@
         </p:nvSpPr>
         <p:spPr>
           <a:xfrm>
-            <a:off x="253963" y="2215355"/>
+            <a:off x="838200" y="2221705"/>
             <a:ext cx="419137" cy="339978"/>
           </a:xfrm>
           <a:prstGeom prst="rect">
@@ -3601,7 +3606,7 @@
         </p:nvSpPr>
         <p:spPr>
           <a:xfrm>
-            <a:off x="253964" y="2148555"/>
+            <a:off x="838201" y="2154905"/>
             <a:ext cx="511211" cy="339978"/>
           </a:xfrm>
           <a:prstGeom prst="rect">
@@ -3651,7 +3656,7 @@
         </p:nvSpPr>
         <p:spPr>
           <a:xfrm>
-            <a:off x="253965" y="2081755"/>
+            <a:off x="838202" y="2088105"/>
             <a:ext cx="584236" cy="339978"/>
           </a:xfrm>
           <a:prstGeom prst="rect">
@@ -3684,10 +3689,9 @@
           <a:p>
             <a:pPr algn="ctr"/>
             <a:r>
-              <a:rPr lang="nl-BE" sz="1200" dirty="0" err="1"/>
+              <a:rPr lang="nl-BE" sz="1200" dirty="0"/>
               <a:t>before</a:t>
             </a:r>
-            <a:endParaRPr lang="nl-BE" sz="1200" dirty="0"/>
           </a:p>
         </p:txBody>
       </p:sp>
@@ -3705,8 +3709,8 @@
         </p:nvSpPr>
         <p:spPr>
           <a:xfrm>
-            <a:off x="1568897" y="2042446"/>
-            <a:ext cx="2031553" cy="554704"/>
+            <a:off x="2153134" y="2048796"/>
+            <a:ext cx="2730053" cy="554704"/>
           </a:xfrm>
           <a:prstGeom prst="bracketPair">
             <a:avLst/>
@@ -3749,7 +3753,7 @@
         </p:nvSpPr>
         <p:spPr>
           <a:xfrm>
-            <a:off x="1613695" y="2216893"/>
+            <a:off x="2197932" y="2223243"/>
             <a:ext cx="419137" cy="339978"/>
           </a:xfrm>
           <a:prstGeom prst="rect">
@@ -3799,7 +3803,7 @@
         </p:nvSpPr>
         <p:spPr>
           <a:xfrm>
-            <a:off x="1613696" y="2150093"/>
+            <a:off x="2197933" y="2156443"/>
             <a:ext cx="511211" cy="339978"/>
           </a:xfrm>
           <a:prstGeom prst="rect">
@@ -3849,7 +3853,7 @@
         </p:nvSpPr>
         <p:spPr>
           <a:xfrm>
-            <a:off x="1613697" y="2083293"/>
+            <a:off x="2197934" y="2089643"/>
             <a:ext cx="584236" cy="339978"/>
           </a:xfrm>
           <a:prstGeom prst="rect">
@@ -3902,7 +3906,7 @@
         </p:nvSpPr>
         <p:spPr>
           <a:xfrm rot="5400000">
-            <a:off x="2840059" y="2201991"/>
+            <a:off x="3424296" y="2208341"/>
             <a:ext cx="159544" cy="61912"/>
           </a:xfrm>
           <a:prstGeom prst="triangle">
@@ -3956,7 +3960,7 @@
         </p:nvSpPr>
         <p:spPr>
           <a:xfrm>
-            <a:off x="2285922" y="2215355"/>
+            <a:off x="2870159" y="2221705"/>
             <a:ext cx="419137" cy="339978"/>
           </a:xfrm>
           <a:prstGeom prst="rect">
@@ -4006,7 +4010,7 @@
         </p:nvSpPr>
         <p:spPr>
           <a:xfrm>
-            <a:off x="2285923" y="2148555"/>
+            <a:off x="2870160" y="2154905"/>
             <a:ext cx="511211" cy="339978"/>
           </a:xfrm>
           <a:prstGeom prst="rect">
@@ -4056,7 +4060,7 @@
         </p:nvSpPr>
         <p:spPr>
           <a:xfrm>
-            <a:off x="2285924" y="2081755"/>
+            <a:off x="2870161" y="2088105"/>
             <a:ext cx="584236" cy="339978"/>
           </a:xfrm>
           <a:prstGeom prst="rect">
@@ -4089,10 +4093,9 @@
           <a:p>
             <a:pPr algn="ctr"/>
             <a:r>
-              <a:rPr lang="nl-BE" sz="1200" dirty="0" err="1"/>
+              <a:rPr lang="nl-BE" sz="1200" dirty="0"/>
               <a:t>enrich</a:t>
             </a:r>
-            <a:endParaRPr lang="nl-BE" sz="1200" dirty="0"/>
           </a:p>
         </p:txBody>
       </p:sp>
@@ -4110,7 +4113,7 @@
         </p:nvSpPr>
         <p:spPr>
           <a:xfrm>
-            <a:off x="2958147" y="2215355"/>
+            <a:off x="3542384" y="2221705"/>
             <a:ext cx="419137" cy="339978"/>
           </a:xfrm>
           <a:prstGeom prst="rect">
@@ -4160,7 +4163,7 @@
         </p:nvSpPr>
         <p:spPr>
           <a:xfrm>
-            <a:off x="2958148" y="2148555"/>
+            <a:off x="3542385" y="2154905"/>
             <a:ext cx="511211" cy="339978"/>
           </a:xfrm>
           <a:prstGeom prst="rect">
@@ -4210,7 +4213,7 @@
         </p:nvSpPr>
         <p:spPr>
           <a:xfrm>
-            <a:off x="2958149" y="2081755"/>
+            <a:off x="3542386" y="2088105"/>
             <a:ext cx="584236" cy="339978"/>
           </a:xfrm>
           <a:prstGeom prst="rect">
@@ -4243,10 +4246,9 @@
           <a:p>
             <a:pPr algn="ctr"/>
             <a:r>
-              <a:rPr lang="nl-BE" sz="1200" dirty="0" err="1"/>
+              <a:rPr lang="nl-BE" sz="1200" dirty="0"/>
               <a:t>process</a:t>
             </a:r>
-            <a:endParaRPr lang="nl-BE" sz="1200" dirty="0"/>
           </a:p>
         </p:txBody>
       </p:sp>
@@ -4264,7 +4266,7 @@
         </p:nvSpPr>
         <p:spPr>
           <a:xfrm>
-            <a:off x="419100" y="2771775"/>
+            <a:off x="5962650" y="3629025"/>
             <a:ext cx="3232768" cy="739775"/>
           </a:xfrm>
           <a:prstGeom prst="star12">
@@ -4321,7 +4323,7 @@
         </p:nvSpPr>
         <p:spPr>
           <a:xfrm rot="5400000">
-            <a:off x="803726" y="2201991"/>
+            <a:off x="1387963" y="2208341"/>
             <a:ext cx="159544" cy="61912"/>
           </a:xfrm>
           <a:prstGeom prst="triangle">
@@ -4358,6 +4360,213 @@
           <a:p>
             <a:pPr algn="ctr"/>
             <a:endParaRPr lang="nl-BE" dirty="0"/>
+          </a:p>
+        </p:txBody>
+      </p:sp>
+      <p:sp>
+        <p:nvSpPr>
+          <p:cNvPr id="2" name="Isosceles Triangle 1">
+            <a:extLst>
+              <a:ext uri="{FF2B5EF4-FFF2-40B4-BE49-F238E27FC236}">
+                <a16:creationId xmlns:a16="http://schemas.microsoft.com/office/drawing/2014/main" id="{EB96BF3A-EBDC-AB4F-4FD4-76EE6D64AD1A}"/>
+              </a:ext>
+            </a:extLst>
+          </p:cNvPr>
+          <p:cNvSpPr/>
+          <p:nvPr/>
+        </p:nvSpPr>
+        <p:spPr>
+          <a:xfrm rot="5400000">
+            <a:off x="4105991" y="2202516"/>
+            <a:ext cx="159544" cy="61912"/>
+          </a:xfrm>
+          <a:prstGeom prst="triangle">
+            <a:avLst/>
+          </a:prstGeom>
+          <a:solidFill>
+            <a:schemeClr val="bg1">
+              <a:lumMod val="75000"/>
+            </a:schemeClr>
+          </a:solidFill>
+          <a:ln>
+            <a:noFill/>
+          </a:ln>
+        </p:spPr>
+        <p:style>
+          <a:lnRef idx="2">
+            <a:schemeClr val="accent1">
+              <a:shade val="50000"/>
+            </a:schemeClr>
+          </a:lnRef>
+          <a:fillRef idx="1">
+            <a:schemeClr val="accent1"/>
+          </a:fillRef>
+          <a:effectRef idx="0">
+            <a:schemeClr val="accent1"/>
+          </a:effectRef>
+          <a:fontRef idx="minor">
+            <a:schemeClr val="lt1"/>
+          </a:fontRef>
+        </p:style>
+        <p:txBody>
+          <a:bodyPr rtlCol="0" anchor="ctr"/>
+          <a:lstStyle/>
+          <a:p>
+            <a:pPr algn="ctr"/>
+            <a:endParaRPr lang="nl-BE" dirty="0"/>
+          </a:p>
+        </p:txBody>
+      </p:sp>
+      <p:sp>
+        <p:nvSpPr>
+          <p:cNvPr id="3" name="Rectangle 2">
+            <a:extLst>
+              <a:ext uri="{FF2B5EF4-FFF2-40B4-BE49-F238E27FC236}">
+                <a16:creationId xmlns:a16="http://schemas.microsoft.com/office/drawing/2014/main" id="{22F80E61-4DAC-1D80-EA50-1B992F9DD093}"/>
+              </a:ext>
+            </a:extLst>
+          </p:cNvPr>
+          <p:cNvSpPr/>
+          <p:nvPr/>
+        </p:nvSpPr>
+        <p:spPr>
+          <a:xfrm>
+            <a:off x="4224079" y="2215880"/>
+            <a:ext cx="419137" cy="339978"/>
+          </a:xfrm>
+          <a:prstGeom prst="rect">
+            <a:avLst/>
+          </a:prstGeom>
+          <a:solidFill>
+            <a:srgbClr val="00B050"/>
+          </a:solidFill>
+          <a:ln w="6350"/>
+        </p:spPr>
+        <p:style>
+          <a:lnRef idx="2">
+            <a:schemeClr val="accent1">
+              <a:shade val="50000"/>
+            </a:schemeClr>
+          </a:lnRef>
+          <a:fillRef idx="1">
+            <a:schemeClr val="accent1"/>
+          </a:fillRef>
+          <a:effectRef idx="0">
+            <a:schemeClr val="accent1"/>
+          </a:effectRef>
+          <a:fontRef idx="minor">
+            <a:schemeClr val="lt1"/>
+          </a:fontRef>
+        </p:style>
+        <p:txBody>
+          <a:bodyPr lIns="36000" rIns="36000" rtlCol="0" anchor="ctr"/>
+          <a:lstStyle/>
+          <a:p>
+            <a:pPr algn="ctr"/>
+            <a:endParaRPr lang="nl-BE" sz="1200" dirty="0"/>
+          </a:p>
+        </p:txBody>
+      </p:sp>
+      <p:sp>
+        <p:nvSpPr>
+          <p:cNvPr id="8" name="Rectangle 7">
+            <a:extLst>
+              <a:ext uri="{FF2B5EF4-FFF2-40B4-BE49-F238E27FC236}">
+                <a16:creationId xmlns:a16="http://schemas.microsoft.com/office/drawing/2014/main" id="{1FA501DB-216D-505E-7410-67E55F276FAC}"/>
+              </a:ext>
+            </a:extLst>
+          </p:cNvPr>
+          <p:cNvSpPr/>
+          <p:nvPr/>
+        </p:nvSpPr>
+        <p:spPr>
+          <a:xfrm>
+            <a:off x="4224080" y="2149080"/>
+            <a:ext cx="511211" cy="339978"/>
+          </a:xfrm>
+          <a:prstGeom prst="rect">
+            <a:avLst/>
+          </a:prstGeom>
+          <a:solidFill>
+            <a:srgbClr val="00B050"/>
+          </a:solidFill>
+          <a:ln w="6350"/>
+        </p:spPr>
+        <p:style>
+          <a:lnRef idx="2">
+            <a:schemeClr val="accent1">
+              <a:shade val="50000"/>
+            </a:schemeClr>
+          </a:lnRef>
+          <a:fillRef idx="1">
+            <a:schemeClr val="accent1"/>
+          </a:fillRef>
+          <a:effectRef idx="0">
+            <a:schemeClr val="accent1"/>
+          </a:effectRef>
+          <a:fontRef idx="minor">
+            <a:schemeClr val="lt1"/>
+          </a:fontRef>
+        </p:style>
+        <p:txBody>
+          <a:bodyPr lIns="36000" rIns="36000" rtlCol="0" anchor="ctr"/>
+          <a:lstStyle/>
+          <a:p>
+            <a:pPr algn="ctr"/>
+            <a:endParaRPr lang="nl-BE" sz="1200" dirty="0"/>
+          </a:p>
+        </p:txBody>
+      </p:sp>
+      <p:sp>
+        <p:nvSpPr>
+          <p:cNvPr id="9" name="Rectangle 8">
+            <a:extLst>
+              <a:ext uri="{FF2B5EF4-FFF2-40B4-BE49-F238E27FC236}">
+                <a16:creationId xmlns:a16="http://schemas.microsoft.com/office/drawing/2014/main" id="{19AC3F8C-F420-D74E-C3F7-49D8B550B9A0}"/>
+              </a:ext>
+            </a:extLst>
+          </p:cNvPr>
+          <p:cNvSpPr/>
+          <p:nvPr/>
+        </p:nvSpPr>
+        <p:spPr>
+          <a:xfrm>
+            <a:off x="4224081" y="2082280"/>
+            <a:ext cx="584236" cy="339978"/>
+          </a:xfrm>
+          <a:prstGeom prst="rect">
+            <a:avLst/>
+          </a:prstGeom>
+          <a:solidFill>
+            <a:srgbClr val="00B050"/>
+          </a:solidFill>
+          <a:ln w="6350"/>
+        </p:spPr>
+        <p:style>
+          <a:lnRef idx="2">
+            <a:schemeClr val="accent1">
+              <a:shade val="50000"/>
+            </a:schemeClr>
+          </a:lnRef>
+          <a:fillRef idx="1">
+            <a:schemeClr val="accent1"/>
+          </a:fillRef>
+          <a:effectRef idx="0">
+            <a:schemeClr val="accent1"/>
+          </a:effectRef>
+          <a:fontRef idx="minor">
+            <a:schemeClr val="lt1"/>
+          </a:fontRef>
+        </p:style>
+        <p:txBody>
+          <a:bodyPr lIns="36000" rIns="36000" rtlCol="0" anchor="ctr"/>
+          <a:lstStyle/>
+          <a:p>
+            <a:pPr algn="ctr"/>
+            <a:r>
+              <a:rPr lang="nl-BE" sz="1200" dirty="0"/>
+              <a:t>after</a:t>
+            </a:r>
           </a:p>
         </p:txBody>
       </p:sp>
@@ -4623,10 +4832,9 @@
           <a:p>
             <a:pPr algn="ctr"/>
             <a:r>
-              <a:rPr lang="nl-BE" sz="1200" dirty="0" err="1"/>
+              <a:rPr lang="nl-BE" sz="1200" dirty="0"/>
               <a:t>process</a:t>
             </a:r>
-            <a:endParaRPr lang="nl-BE" sz="1200" dirty="0"/>
           </a:p>
         </p:txBody>
       </p:sp>
@@ -5774,7 +5982,7 @@
 
 <file path=ppt/tags/tag1.xml><?xml version="1.0" encoding="utf-8"?>
 <p:tagLst xmlns:a="http://schemas.openxmlformats.org/drawingml/2006/main" xmlns:r="http://schemas.openxmlformats.org/officeDocument/2006/relationships" xmlns:p="http://schemas.openxmlformats.org/presentationml/2006/main">
-  <p:tag name="WR_METADATA_KEY" val="f649dedc-8144-4798-bd8f-84e3e718dadf"/>
+  <p:tag name="WR_METADATA_KEY" val="ed3244a9-d065-40b7-b6f9-c23eba8a49c6"/>
 </p:tagLst>
 </file>
 

</xml_diff>